<commit_message>
Added Lecture 5 slides again
</commit_message>
<xml_diff>
--- a/lecture_05/Fundamentals of Web Development.pptx
+++ b/lecture_05/Fundamentals of Web Development.pptx
@@ -282,7 +282,7 @@
           <a:p>
             <a:fld id="{DD7909B4-0034-084A-82BA-DE59354427DE}" type="datetime1">
               <a:rPr lang="en-US" smtClean="0"/>
-              <a:t>12/31/19</a:t>
+              <a:t>1/2/20</a:t>
             </a:fld>
             <a:endParaRPr lang="en-US"/>
           </a:p>
@@ -448,7 +448,7 @@
           <a:p>
             <a:fld id="{9BAEE3B6-A6CF-1B42-910E-8E290E739F0F}" type="datetime1">
               <a:rPr lang="en-US" smtClean="0"/>
-              <a:t>12/31/19</a:t>
+              <a:t>1/2/20</a:t>
             </a:fld>
             <a:endParaRPr lang="en-US"/>
           </a:p>
@@ -19860,7 +19860,7 @@
         </p:nvSpPr>
         <p:spPr>
           <a:xfrm>
-            <a:off x="301546" y="1378357"/>
+            <a:off x="199810" y="1112004"/>
             <a:ext cx="11585731" cy="5253214"/>
           </a:xfrm>
         </p:spPr>
@@ -19872,7 +19872,7 @@
               <a:buNone/>
             </a:pPr>
             <a:r>
-              <a:rPr lang="en-US" sz="2000" dirty="0">
+              <a:rPr lang="en-US" sz="1800" dirty="0">
                 <a:solidFill>
                   <a:srgbClr val="404040"/>
                 </a:solidFill>
@@ -19880,12 +19880,12 @@
                 <a:ea typeface="Verdana" panose="020B0604030504040204" pitchFamily="34" charset="0"/>
                 <a:cs typeface="Verdana" panose="020B0604030504040204" pitchFamily="34" charset="0"/>
               </a:rPr>
-              <a:t>There are many different types of request methods.  For this course, you will be using 4:</a:t>
-            </a:r>
-          </a:p>
-          <a:p>
-            <a:r>
-              <a:rPr lang="en-US" sz="1800" b="1" dirty="0">
+              <a:t>There are many different types of request methods.  For this course, you will be using 5:</a:t>
+            </a:r>
+          </a:p>
+          <a:p>
+            <a:r>
+              <a:rPr lang="en-US" b="1" dirty="0">
                 <a:solidFill>
                   <a:srgbClr val="AB263D"/>
                 </a:solidFill>
@@ -19899,7 +19899,7 @@
           <a:p>
             <a:pPr lvl="1"/>
             <a:r>
-              <a:rPr lang="en-US" sz="1600" dirty="0">
+              <a:rPr lang="en-US" dirty="0">
                 <a:solidFill>
                   <a:srgbClr val="404040"/>
                 </a:solidFill>
@@ -19912,7 +19912,7 @@
           </a:p>
           <a:p>
             <a:r>
-              <a:rPr lang="en-US" sz="1800" b="1" dirty="0">
+              <a:rPr lang="en-US" b="1" dirty="0">
                 <a:solidFill>
                   <a:srgbClr val="AB263D"/>
                 </a:solidFill>
@@ -19926,7 +19926,7 @@
           <a:p>
             <a:pPr lvl="1"/>
             <a:r>
-              <a:rPr lang="en-US" sz="1600" dirty="0">
+              <a:rPr lang="en-US" dirty="0">
                 <a:solidFill>
                   <a:srgbClr val="404040"/>
                 </a:solidFill>
@@ -19939,7 +19939,7 @@
           </a:p>
           <a:p>
             <a:r>
-              <a:rPr lang="en-US" sz="1800" b="1" dirty="0">
+              <a:rPr lang="en-US" b="1" dirty="0">
                 <a:solidFill>
                   <a:srgbClr val="AB263D"/>
                 </a:solidFill>
@@ -19953,7 +19953,7 @@
           <a:p>
             <a:pPr lvl="1"/>
             <a:r>
-              <a:rPr lang="en-US" sz="1600" dirty="0">
+              <a:rPr lang="en-US" dirty="0">
                 <a:solidFill>
                   <a:srgbClr val="404040"/>
                 </a:solidFill>
@@ -19966,7 +19966,7 @@
           </a:p>
           <a:p>
             <a:r>
-              <a:rPr lang="en-US" sz="1800" b="1" dirty="0">
+              <a:rPr lang="en-US" b="1" dirty="0">
                 <a:solidFill>
                   <a:srgbClr val="AB263D"/>
                 </a:solidFill>
@@ -19974,13 +19974,13 @@
                 <a:ea typeface="Verdana" panose="020B0604030504040204" pitchFamily="34" charset="0"/>
                 <a:cs typeface="Verdana" panose="020B0604030504040204" pitchFamily="34" charset="0"/>
               </a:rPr>
-              <a:t>DELETE</a:t>
+              <a:t>PATCH</a:t>
             </a:r>
           </a:p>
           <a:p>
             <a:pPr lvl="1"/>
             <a:r>
-              <a:rPr lang="en-US" sz="1600" dirty="0">
+              <a:rPr lang="en-US" dirty="0">
                 <a:solidFill>
                   <a:srgbClr val="404040"/>
                 </a:solidFill>
@@ -19988,26 +19988,53 @@
                 <a:ea typeface="Verdana" panose="020B0604030504040204" pitchFamily="34" charset="0"/>
                 <a:cs typeface="Verdana" panose="020B0604030504040204" pitchFamily="34" charset="0"/>
               </a:rPr>
-              <a:t>The DELETE method deletes the specified resource.</a:t>
-            </a:r>
-          </a:p>
-          <a:p>
-            <a:r>
-              <a:rPr lang="en-US" sz="1800" dirty="0">
-                <a:solidFill>
-                  <a:srgbClr val="404040"/>
+              <a:t>Similar to PUT, but you can replace portions of the resource instead of the whole resource. </a:t>
+            </a:r>
+          </a:p>
+          <a:p>
+            <a:r>
+              <a:rPr lang="en-US" b="1" dirty="0">
+                <a:solidFill>
+                  <a:srgbClr val="AB263D"/>
                 </a:solidFill>
                 <a:latin typeface="Verdana" panose="020B0604030504040204" pitchFamily="34" charset="0"/>
                 <a:ea typeface="Verdana" panose="020B0604030504040204" pitchFamily="34" charset="0"/>
                 <a:cs typeface="Verdana" panose="020B0604030504040204" pitchFamily="34" charset="0"/>
               </a:rPr>
+              <a:t>DELETE</a:t>
+            </a:r>
+          </a:p>
+          <a:p>
+            <a:pPr lvl="1"/>
+            <a:r>
+              <a:rPr lang="en-US" dirty="0">
+                <a:solidFill>
+                  <a:srgbClr val="404040"/>
+                </a:solidFill>
+                <a:latin typeface="Verdana" panose="020B0604030504040204" pitchFamily="34" charset="0"/>
+                <a:ea typeface="Verdana" panose="020B0604030504040204" pitchFamily="34" charset="0"/>
+                <a:cs typeface="Verdana" panose="020B0604030504040204" pitchFamily="34" charset="0"/>
+              </a:rPr>
+              <a:t>The DELETE method deletes the specified resource.</a:t>
+            </a:r>
+          </a:p>
+          <a:p>
+            <a:r>
+              <a:rPr lang="en-US" dirty="0">
+                <a:solidFill>
+                  <a:srgbClr val="404040"/>
+                </a:solidFill>
+                <a:latin typeface="Verdana" panose="020B0604030504040204" pitchFamily="34" charset="0"/>
+                <a:ea typeface="Verdana" panose="020B0604030504040204" pitchFamily="34" charset="0"/>
+                <a:cs typeface="Verdana" panose="020B0604030504040204" pitchFamily="34" charset="0"/>
+              </a:rPr>
               <a:t>Other Methods</a:t>
             </a:r>
           </a:p>
           <a:p>
             <a:pPr lvl="1"/>
             <a:r>
-              <a:rPr lang="en-US" sz="1600" dirty="0">
+              <a:rPr lang="en-US" dirty="0">
                 <a:solidFill>
                   <a:srgbClr val="AB263D"/>
                 </a:solidFill>
@@ -20025,7 +20052,7 @@
               <a:t>https://developer.mozilla.org/en-US/docs/Web/HTTP/Methods</a:t>
             </a:r>
             <a:r>
-              <a:rPr lang="en-US" sz="1600" dirty="0">
+              <a:rPr lang="en-US" dirty="0">
                 <a:solidFill>
                   <a:srgbClr val="AB263D"/>
                 </a:solidFill>

</xml_diff>